<commit_message>
removed certs, cleaned app, cleaned demos
First run through of demos. Added some checks, removed code with issues.
</commit_message>
<xml_diff>
--- a/EndtoEndAlwaysEncrypted.pptx
+++ b/EndtoEndAlwaysEncrypted.pptx
@@ -5,7 +5,7 @@
     <p:sldMasterId id="2147483648" r:id="rId1"/>
   </p:sldMasterIdLst>
   <p:notesMasterIdLst>
-    <p:notesMasterId r:id="rId26"/>
+    <p:notesMasterId r:id="rId28"/>
   </p:notesMasterIdLst>
   <p:sldIdLst>
     <p:sldId id="256" r:id="rId2"/>
@@ -27,11 +27,13 @@
     <p:sldId id="272" r:id="rId18"/>
     <p:sldId id="269" r:id="rId19"/>
     <p:sldId id="258" r:id="rId20"/>
-    <p:sldId id="270" r:id="rId21"/>
-    <p:sldId id="280" r:id="rId22"/>
-    <p:sldId id="266" r:id="rId23"/>
-    <p:sldId id="262" r:id="rId24"/>
-    <p:sldId id="279" r:id="rId25"/>
+    <p:sldId id="281" r:id="rId21"/>
+    <p:sldId id="270" r:id="rId22"/>
+    <p:sldId id="282" r:id="rId23"/>
+    <p:sldId id="280" r:id="rId24"/>
+    <p:sldId id="266" r:id="rId25"/>
+    <p:sldId id="262" r:id="rId26"/>
+    <p:sldId id="279" r:id="rId27"/>
   </p:sldIdLst>
   <p:sldSz cx="12192000" cy="6858000"/>
   <p:notesSz cx="6858000" cy="9144000"/>
@@ -220,7 +222,7 @@
           <a:p>
             <a:fld id="{501103D5-940C-4BC6-8DD6-EC56A2463EE0}" type="datetimeFigureOut">
               <a:rPr lang="en-US" smtClean="0"/>
-              <a:t>4/10/2016</a:t>
+              <a:t>4/13/2016</a:t>
             </a:fld>
             <a:endParaRPr lang="en-US"/>
           </a:p>
@@ -506,6 +508,145 @@
       </p:grpSpPr>
       <p:sp>
         <p:nvSpPr>
+          <p:cNvPr id="2" name="Slide Image Placeholder 1"/>
+          <p:cNvSpPr>
+            <a:spLocks noGrp="1" noRot="1" noChangeAspect="1"/>
+          </p:cNvSpPr>
+          <p:nvPr>
+            <p:ph type="sldImg"/>
+          </p:nvPr>
+        </p:nvSpPr>
+        <p:spPr/>
+      </p:sp>
+      <p:sp>
+        <p:nvSpPr>
+          <p:cNvPr id="3" name="Notes Placeholder 2"/>
+          <p:cNvSpPr>
+            <a:spLocks noGrp="1"/>
+          </p:cNvSpPr>
+          <p:nvPr>
+            <p:ph type="body" idx="1"/>
+          </p:nvPr>
+        </p:nvSpPr>
+        <p:spPr/>
+        <p:txBody>
+          <a:bodyPr/>
+          <a:lstStyle/>
+          <a:p>
+            <a:r>
+              <a:rPr lang="en-US" dirty="0"/>
+              <a:t>Open User</a:t>
+            </a:r>
+            <a:r>
+              <a:rPr lang="en-US" baseline="0" dirty="0"/>
+              <a:t> Certificates</a:t>
+            </a:r>
+          </a:p>
+          <a:p>
+            <a:r>
+              <a:rPr lang="en-US" baseline="0" dirty="0"/>
+              <a:t>Open SSMS as </a:t>
+            </a:r>
+            <a:r>
+              <a:rPr lang="en-US" baseline="0" dirty="0" err="1"/>
+              <a:t>Administator</a:t>
+            </a:r>
+            <a:r>
+              <a:rPr lang="en-US" baseline="0" dirty="0"/>
+              <a:t>, open </a:t>
+            </a:r>
+            <a:r>
+              <a:rPr lang="en-US" baseline="0" dirty="0" err="1"/>
+              <a:t>db</a:t>
+            </a:r>
+            <a:r>
+              <a:rPr lang="en-US" baseline="0" dirty="0"/>
+              <a:t> setup (00_xx)</a:t>
+            </a:r>
+          </a:p>
+          <a:p>
+            <a:r>
+              <a:rPr lang="en-US" baseline="0" dirty="0"/>
+              <a:t>  - connect to local .\2016, .\2014, </a:t>
+            </a:r>
+            <a:r>
+              <a:rPr lang="en-US" baseline="0" dirty="0" err="1"/>
+              <a:t>vm</a:t>
+            </a:r>
+            <a:r>
+              <a:rPr lang="en-US" baseline="0" dirty="0"/>
+              <a:t>\2016</a:t>
+            </a:r>
+          </a:p>
+          <a:p>
+            <a:r>
+              <a:rPr lang="en-US" baseline="0" dirty="0"/>
+              <a:t>Open VS, solution for Always Encrypted</a:t>
+            </a:r>
+          </a:p>
+          <a:p>
+            <a:endParaRPr lang="en-US" dirty="0"/>
+          </a:p>
+          <a:p>
+            <a:endParaRPr lang="en-US" dirty="0"/>
+          </a:p>
+        </p:txBody>
+      </p:sp>
+      <p:sp>
+        <p:nvSpPr>
+          <p:cNvPr id="4" name="Slide Number Placeholder 3"/>
+          <p:cNvSpPr>
+            <a:spLocks noGrp="1"/>
+          </p:cNvSpPr>
+          <p:nvPr>
+            <p:ph type="sldNum" sz="quarter" idx="10"/>
+          </p:nvPr>
+        </p:nvSpPr>
+        <p:spPr/>
+        <p:txBody>
+          <a:bodyPr/>
+          <a:lstStyle/>
+          <a:p>
+            <a:fld id="{FA11749C-2C7E-467C-B17D-61D5024F7C8E}" type="slidenum">
+              <a:rPr lang="en-US" smtClean="0"/>
+              <a:t>1</a:t>
+            </a:fld>
+            <a:endParaRPr lang="en-US"/>
+          </a:p>
+        </p:txBody>
+      </p:sp>
+    </p:spTree>
+    <p:extLst>
+      <p:ext uri="{BB962C8B-B14F-4D97-AF65-F5344CB8AC3E}">
+        <p14:creationId xmlns:p14="http://schemas.microsoft.com/office/powerpoint/2010/main" val="853064046"/>
+      </p:ext>
+    </p:extLst>
+  </p:cSld>
+  <p:clrMapOvr>
+    <a:masterClrMapping/>
+  </p:clrMapOvr>
+</p:notes>
+</file>
+
+<file path=ppt/notesSlides/notesSlide2.xml><?xml version="1.0" encoding="utf-8"?>
+<p:notes xmlns:a="http://schemas.openxmlformats.org/drawingml/2006/main" xmlns:r="http://schemas.openxmlformats.org/officeDocument/2006/relationships" xmlns:p="http://schemas.openxmlformats.org/presentationml/2006/main">
+  <p:cSld>
+    <p:spTree>
+      <p:nvGrpSpPr>
+        <p:cNvPr id="1" name=""/>
+        <p:cNvGrpSpPr/>
+        <p:nvPr/>
+      </p:nvGrpSpPr>
+      <p:grpSpPr>
+        <a:xfrm>
+          <a:off x="0" y="0"/>
+          <a:ext cx="0" cy="0"/>
+          <a:chOff x="0" y="0"/>
+          <a:chExt cx="0" cy="0"/>
+        </a:xfrm>
+      </p:grpSpPr>
+      <p:sp>
+        <p:nvSpPr>
           <p:cNvPr id="18434" name="Slide Image Placeholder 1"/>
           <p:cNvSpPr>
             <a:spLocks noGrp="1" noRot="1" noChangeAspect="1" noTextEdit="1"/>
@@ -756,7 +897,7 @@
 </p:notes>
 </file>
 
-<file path=ppt/notesSlides/notesSlide2.xml><?xml version="1.0" encoding="utf-8"?>
+<file path=ppt/notesSlides/notesSlide3.xml><?xml version="1.0" encoding="utf-8"?>
 <p:notes xmlns:a="http://schemas.openxmlformats.org/drawingml/2006/main" xmlns:r="http://schemas.openxmlformats.org/officeDocument/2006/relationships" xmlns:p="http://schemas.openxmlformats.org/presentationml/2006/main">
   <p:cSld>
     <p:spTree>
@@ -847,109 +988,6 @@
     <p:extLst>
       <p:ext uri="{BB962C8B-B14F-4D97-AF65-F5344CB8AC3E}">
         <p14:creationId xmlns:p14="http://schemas.microsoft.com/office/powerpoint/2010/main" val="1023941857"/>
-      </p:ext>
-    </p:extLst>
-  </p:cSld>
-  <p:clrMapOvr>
-    <a:masterClrMapping/>
-  </p:clrMapOvr>
-</p:notes>
-</file>
-
-<file path=ppt/notesSlides/notesSlide3.xml><?xml version="1.0" encoding="utf-8"?>
-<p:notes xmlns:a="http://schemas.openxmlformats.org/drawingml/2006/main" xmlns:r="http://schemas.openxmlformats.org/officeDocument/2006/relationships" xmlns:p="http://schemas.openxmlformats.org/presentationml/2006/main">
-  <p:cSld>
-    <p:spTree>
-      <p:nvGrpSpPr>
-        <p:cNvPr id="1" name=""/>
-        <p:cNvGrpSpPr/>
-        <p:nvPr/>
-      </p:nvGrpSpPr>
-      <p:grpSpPr>
-        <a:xfrm>
-          <a:off x="0" y="0"/>
-          <a:ext cx="0" cy="0"/>
-          <a:chOff x="0" y="0"/>
-          <a:chExt cx="0" cy="0"/>
-        </a:xfrm>
-      </p:grpSpPr>
-      <p:sp>
-        <p:nvSpPr>
-          <p:cNvPr id="2" name="Slide Image Placeholder 1"/>
-          <p:cNvSpPr>
-            <a:spLocks noGrp="1" noRot="1" noChangeAspect="1"/>
-          </p:cNvSpPr>
-          <p:nvPr>
-            <p:ph type="sldImg"/>
-          </p:nvPr>
-        </p:nvSpPr>
-        <p:spPr/>
-      </p:sp>
-      <p:sp>
-        <p:nvSpPr>
-          <p:cNvPr id="3" name="Notes Placeholder 2"/>
-          <p:cNvSpPr>
-            <a:spLocks noGrp="1"/>
-          </p:cNvSpPr>
-          <p:nvPr>
-            <p:ph type="body" idx="1"/>
-          </p:nvPr>
-        </p:nvSpPr>
-        <p:spPr/>
-        <p:txBody>
-          <a:bodyPr/>
-          <a:lstStyle/>
-          <a:p>
-            <a:r>
-              <a:rPr lang="en-US" dirty="0"/>
-              <a:t>We use</a:t>
-            </a:r>
-            <a:r>
-              <a:rPr lang="en-US" baseline="0" dirty="0"/>
-              <a:t> functions and keys, here’s an example. </a:t>
-            </a:r>
-          </a:p>
-          <a:p>
-            <a:r>
-              <a:rPr lang="en-US" baseline="0" dirty="0"/>
-              <a:t>Describe</a:t>
-            </a:r>
-          </a:p>
-          <a:p>
-            <a:r>
-              <a:rPr lang="en-US" baseline="0" dirty="0"/>
-              <a:t>The function’s complexity determines the resources required to perform encryption, and usually, the security of the encryption process.</a:t>
-            </a:r>
-          </a:p>
-        </p:txBody>
-      </p:sp>
-      <p:sp>
-        <p:nvSpPr>
-          <p:cNvPr id="4" name="Slide Number Placeholder 3"/>
-          <p:cNvSpPr>
-            <a:spLocks noGrp="1"/>
-          </p:cNvSpPr>
-          <p:nvPr>
-            <p:ph type="sldNum" sz="quarter" idx="10"/>
-          </p:nvPr>
-        </p:nvSpPr>
-        <p:spPr/>
-        <p:txBody>
-          <a:bodyPr/>
-          <a:lstStyle/>
-          <a:p>
-            <a:fld id="{FA11749C-2C7E-467C-B17D-61D5024F7C8E}" type="slidenum">
-              <a:rPr lang="en-US" smtClean="0"/>
-              <a:t>5</a:t>
-            </a:fld>
-            <a:endParaRPr lang="en-US"/>
-          </a:p>
-        </p:txBody>
-      </p:sp>
-    </p:spTree>
-    <p:extLst>
-      <p:ext uri="{BB962C8B-B14F-4D97-AF65-F5344CB8AC3E}">
-        <p14:creationId xmlns:p14="http://schemas.microsoft.com/office/powerpoint/2010/main" val="1555796874"/>
       </p:ext>
     </p:extLst>
   </p:cSld>
@@ -1005,13 +1043,24 @@
           <a:p>
             <a:r>
               <a:rPr lang="en-US" dirty="0"/>
-              <a:t>Banks use a two stage</a:t>
+              <a:t>We use</a:t>
             </a:r>
             <a:r>
               <a:rPr lang="en-US" baseline="0" dirty="0"/>
-              <a:t> protection. They use a very strong outer lock., the bank vault door.</a:t>
-            </a:r>
-            <a:endParaRPr lang="en-US" dirty="0"/>
+              <a:t> functions and keys, here’s an example. </a:t>
+            </a:r>
+          </a:p>
+          <a:p>
+            <a:r>
+              <a:rPr lang="en-US" baseline="0" dirty="0"/>
+              <a:t>Describe</a:t>
+            </a:r>
+          </a:p>
+          <a:p>
+            <a:r>
+              <a:rPr lang="en-US" baseline="0" dirty="0"/>
+              <a:t>The function’s complexity determines the resources required to perform encryption, and usually, the security of the encryption process.</a:t>
+            </a:r>
           </a:p>
         </p:txBody>
       </p:sp>
@@ -1032,7 +1081,7 @@
           <a:p>
             <a:fld id="{FA11749C-2C7E-467C-B17D-61D5024F7C8E}" type="slidenum">
               <a:rPr lang="en-US" smtClean="0"/>
-              <a:t>6</a:t>
+              <a:t>5</a:t>
             </a:fld>
             <a:endParaRPr lang="en-US"/>
           </a:p>
@@ -1041,7 +1090,7 @@
     </p:spTree>
     <p:extLst>
       <p:ext uri="{BB962C8B-B14F-4D97-AF65-F5344CB8AC3E}">
-        <p14:creationId xmlns:p14="http://schemas.microsoft.com/office/powerpoint/2010/main" val="3963991342"/>
+        <p14:creationId xmlns:p14="http://schemas.microsoft.com/office/powerpoint/2010/main" val="1555796874"/>
       </p:ext>
     </p:extLst>
   </p:cSld>
@@ -1097,11 +1146,11 @@
           <a:p>
             <a:r>
               <a:rPr lang="en-US" dirty="0"/>
-              <a:t>They use relatively weaker</a:t>
+              <a:t>Banks use a two stage</a:t>
             </a:r>
             <a:r>
               <a:rPr lang="en-US" baseline="0" dirty="0"/>
-              <a:t> locks inside. These are easier to break into.</a:t>
+              <a:t> protection. They use a very strong outer lock., the bank vault door.</a:t>
             </a:r>
             <a:endParaRPr lang="en-US" dirty="0"/>
           </a:p>
@@ -1124,7 +1173,7 @@
           <a:p>
             <a:fld id="{FA11749C-2C7E-467C-B17D-61D5024F7C8E}" type="slidenum">
               <a:rPr lang="en-US" smtClean="0"/>
-              <a:t>7</a:t>
+              <a:t>6</a:t>
             </a:fld>
             <a:endParaRPr lang="en-US"/>
           </a:p>
@@ -1133,7 +1182,7 @@
     </p:spTree>
     <p:extLst>
       <p:ext uri="{BB962C8B-B14F-4D97-AF65-F5344CB8AC3E}">
-        <p14:creationId xmlns:p14="http://schemas.microsoft.com/office/powerpoint/2010/main" val="414749270"/>
+        <p14:creationId xmlns:p14="http://schemas.microsoft.com/office/powerpoint/2010/main" val="3963991342"/>
       </p:ext>
     </p:extLst>
   </p:cSld>
@@ -1189,6 +1238,98 @@
           <a:p>
             <a:r>
               <a:rPr lang="en-US" dirty="0"/>
+              <a:t>They use relatively weaker</a:t>
+            </a:r>
+            <a:r>
+              <a:rPr lang="en-US" baseline="0" dirty="0"/>
+              <a:t> locks inside. These are easier to break into.</a:t>
+            </a:r>
+            <a:endParaRPr lang="en-US" dirty="0"/>
+          </a:p>
+        </p:txBody>
+      </p:sp>
+      <p:sp>
+        <p:nvSpPr>
+          <p:cNvPr id="4" name="Slide Number Placeholder 3"/>
+          <p:cNvSpPr>
+            <a:spLocks noGrp="1"/>
+          </p:cNvSpPr>
+          <p:nvPr>
+            <p:ph type="sldNum" sz="quarter" idx="10"/>
+          </p:nvPr>
+        </p:nvSpPr>
+        <p:spPr/>
+        <p:txBody>
+          <a:bodyPr/>
+          <a:lstStyle/>
+          <a:p>
+            <a:fld id="{FA11749C-2C7E-467C-B17D-61D5024F7C8E}" type="slidenum">
+              <a:rPr lang="en-US" smtClean="0"/>
+              <a:t>7</a:t>
+            </a:fld>
+            <a:endParaRPr lang="en-US"/>
+          </a:p>
+        </p:txBody>
+      </p:sp>
+    </p:spTree>
+    <p:extLst>
+      <p:ext uri="{BB962C8B-B14F-4D97-AF65-F5344CB8AC3E}">
+        <p14:creationId xmlns:p14="http://schemas.microsoft.com/office/powerpoint/2010/main" val="414749270"/>
+      </p:ext>
+    </p:extLst>
+  </p:cSld>
+  <p:clrMapOvr>
+    <a:masterClrMapping/>
+  </p:clrMapOvr>
+</p:notes>
+</file>
+
+<file path=ppt/notesSlides/notesSlide7.xml><?xml version="1.0" encoding="utf-8"?>
+<p:notes xmlns:a="http://schemas.openxmlformats.org/drawingml/2006/main" xmlns:r="http://schemas.openxmlformats.org/officeDocument/2006/relationships" xmlns:p="http://schemas.openxmlformats.org/presentationml/2006/main">
+  <p:cSld>
+    <p:spTree>
+      <p:nvGrpSpPr>
+        <p:cNvPr id="1" name=""/>
+        <p:cNvGrpSpPr/>
+        <p:nvPr/>
+      </p:nvGrpSpPr>
+      <p:grpSpPr>
+        <a:xfrm>
+          <a:off x="0" y="0"/>
+          <a:ext cx="0" cy="0"/>
+          <a:chOff x="0" y="0"/>
+          <a:chExt cx="0" cy="0"/>
+        </a:xfrm>
+      </p:grpSpPr>
+      <p:sp>
+        <p:nvSpPr>
+          <p:cNvPr id="2" name="Slide Image Placeholder 1"/>
+          <p:cNvSpPr>
+            <a:spLocks noGrp="1" noRot="1" noChangeAspect="1"/>
+          </p:cNvSpPr>
+          <p:nvPr>
+            <p:ph type="sldImg"/>
+          </p:nvPr>
+        </p:nvSpPr>
+        <p:spPr/>
+      </p:sp>
+      <p:sp>
+        <p:nvSpPr>
+          <p:cNvPr id="3" name="Notes Placeholder 2"/>
+          <p:cNvSpPr>
+            <a:spLocks noGrp="1"/>
+          </p:cNvSpPr>
+          <p:nvPr>
+            <p:ph type="body" idx="1"/>
+          </p:nvPr>
+        </p:nvSpPr>
+        <p:spPr/>
+        <p:txBody>
+          <a:bodyPr/>
+          <a:lstStyle/>
+          <a:p>
+            <a:r>
+              <a:rPr lang="en-US" dirty="0"/>
               <a:t>Create new table</a:t>
             </a:r>
           </a:p>
@@ -1249,7 +1390,7 @@
 </p:notes>
 </file>
 
-<file path=ppt/notesSlides/notesSlide7.xml><?xml version="1.0" encoding="utf-8"?>
+<file path=ppt/notesSlides/notesSlide8.xml><?xml version="1.0" encoding="utf-8"?>
 <p:notes xmlns:a="http://schemas.openxmlformats.org/drawingml/2006/main" xmlns:r="http://schemas.openxmlformats.org/officeDocument/2006/relationships" xmlns:p="http://schemas.openxmlformats.org/presentationml/2006/main">
   <p:cSld>
     <p:spTree>
@@ -1493,7 +1634,7 @@
           <a:p>
             <a:fld id="{AFE28CCF-C73F-479B-94EC-A5E54FF894ED}" type="datetimeFigureOut">
               <a:rPr lang="en-US" smtClean="0"/>
-              <a:t>4/10/2016</a:t>
+              <a:t>4/13/2016</a:t>
             </a:fld>
             <a:endParaRPr lang="en-US"/>
           </a:p>
@@ -1661,7 +1802,7 @@
           <a:p>
             <a:fld id="{AFE28CCF-C73F-479B-94EC-A5E54FF894ED}" type="datetimeFigureOut">
               <a:rPr lang="en-US" smtClean="0"/>
-              <a:t>4/10/2016</a:t>
+              <a:t>4/13/2016</a:t>
             </a:fld>
             <a:endParaRPr lang="en-US"/>
           </a:p>
@@ -1839,7 +1980,7 @@
           <a:p>
             <a:fld id="{AFE28CCF-C73F-479B-94EC-A5E54FF894ED}" type="datetimeFigureOut">
               <a:rPr lang="en-US" smtClean="0"/>
-              <a:t>4/10/2016</a:t>
+              <a:t>4/13/2016</a:t>
             </a:fld>
             <a:endParaRPr lang="en-US"/>
           </a:p>
@@ -2007,7 +2148,7 @@
           <a:p>
             <a:fld id="{AFE28CCF-C73F-479B-94EC-A5E54FF894ED}" type="datetimeFigureOut">
               <a:rPr lang="en-US" smtClean="0"/>
-              <a:t>4/10/2016</a:t>
+              <a:t>4/13/2016</a:t>
             </a:fld>
             <a:endParaRPr lang="en-US"/>
           </a:p>
@@ -2252,7 +2393,7 @@
           <a:p>
             <a:fld id="{AFE28CCF-C73F-479B-94EC-A5E54FF894ED}" type="datetimeFigureOut">
               <a:rPr lang="en-US" smtClean="0"/>
-              <a:t>4/10/2016</a:t>
+              <a:t>4/13/2016</a:t>
             </a:fld>
             <a:endParaRPr lang="en-US"/>
           </a:p>
@@ -2481,7 +2622,7 @@
           <a:p>
             <a:fld id="{AFE28CCF-C73F-479B-94EC-A5E54FF894ED}" type="datetimeFigureOut">
               <a:rPr lang="en-US" smtClean="0"/>
-              <a:t>4/10/2016</a:t>
+              <a:t>4/13/2016</a:t>
             </a:fld>
             <a:endParaRPr lang="en-US"/>
           </a:p>
@@ -2845,7 +2986,7 @@
           <a:p>
             <a:fld id="{AFE28CCF-C73F-479B-94EC-A5E54FF894ED}" type="datetimeFigureOut">
               <a:rPr lang="en-US" smtClean="0"/>
-              <a:t>4/10/2016</a:t>
+              <a:t>4/13/2016</a:t>
             </a:fld>
             <a:endParaRPr lang="en-US"/>
           </a:p>
@@ -2962,7 +3103,7 @@
           <a:p>
             <a:fld id="{AFE28CCF-C73F-479B-94EC-A5E54FF894ED}" type="datetimeFigureOut">
               <a:rPr lang="en-US" smtClean="0"/>
-              <a:t>4/10/2016</a:t>
+              <a:t>4/13/2016</a:t>
             </a:fld>
             <a:endParaRPr lang="en-US"/>
           </a:p>
@@ -3057,7 +3198,7 @@
           <a:p>
             <a:fld id="{AFE28CCF-C73F-479B-94EC-A5E54FF894ED}" type="datetimeFigureOut">
               <a:rPr lang="en-US" smtClean="0"/>
-              <a:t>4/10/2016</a:t>
+              <a:t>4/13/2016</a:t>
             </a:fld>
             <a:endParaRPr lang="en-US"/>
           </a:p>
@@ -3332,7 +3473,7 @@
           <a:p>
             <a:fld id="{AFE28CCF-C73F-479B-94EC-A5E54FF894ED}" type="datetimeFigureOut">
               <a:rPr lang="en-US" smtClean="0"/>
-              <a:t>4/10/2016</a:t>
+              <a:t>4/13/2016</a:t>
             </a:fld>
             <a:endParaRPr lang="en-US"/>
           </a:p>
@@ -3584,7 +3725,7 @@
           <a:p>
             <a:fld id="{AFE28CCF-C73F-479B-94EC-A5E54FF894ED}" type="datetimeFigureOut">
               <a:rPr lang="en-US" smtClean="0"/>
-              <a:t>4/10/2016</a:t>
+              <a:t>4/13/2016</a:t>
             </a:fld>
             <a:endParaRPr lang="en-US"/>
           </a:p>
@@ -3795,7 +3936,7 @@
           <a:p>
             <a:fld id="{AFE28CCF-C73F-479B-94EC-A5E54FF894ED}" type="datetimeFigureOut">
               <a:rPr lang="en-US" smtClean="0"/>
-              <a:t>4/10/2016</a:t>
+              <a:t>4/13/2016</a:t>
             </a:fld>
             <a:endParaRPr lang="en-US"/>
           </a:p>
@@ -5333,7 +5474,7 @@
       </p:grpSpPr>
       <p:sp>
         <p:nvSpPr>
-          <p:cNvPr id="4" name="Title 3"/>
+          <p:cNvPr id="2" name="Title 1"/>
           <p:cNvSpPr>
             <a:spLocks noGrp="1"/>
           </p:cNvSpPr>
@@ -5348,29 +5489,70 @@
           <a:p>
             <a:r>
               <a:rPr lang="en-US" dirty="0"/>
-              <a:t>Demo</a:t>
-            </a:r>
-          </a:p>
-        </p:txBody>
-      </p:sp>
-      <p:sp>
-        <p:nvSpPr>
-          <p:cNvPr id="5" name="Text Placeholder 4"/>
-          <p:cNvSpPr>
-            <a:spLocks noGrp="1"/>
-          </p:cNvSpPr>
-          <p:nvPr>
-            <p:ph type="body" idx="1"/>
+              <a:t>Limitations – </a:t>
+            </a:r>
+            <a:r>
+              <a:rPr lang="en-US" dirty="0" err="1"/>
+              <a:t>Quiese</a:t>
+            </a:r>
+            <a:r>
+              <a:rPr lang="en-US" dirty="0"/>
+              <a:t> the Table</a:t>
+            </a:r>
+          </a:p>
+        </p:txBody>
+      </p:sp>
+      <p:sp>
+        <p:nvSpPr>
+          <p:cNvPr id="3" name="Content Placeholder 2"/>
+          <p:cNvSpPr>
+            <a:spLocks noGrp="1"/>
+          </p:cNvSpPr>
+          <p:nvPr>
+            <p:ph idx="1"/>
           </p:nvPr>
         </p:nvSpPr>
         <p:spPr/>
         <p:txBody>
-          <a:bodyPr/>
-          <a:lstStyle/>
-          <a:p>
+          <a:bodyPr>
+            <a:normAutofit fontScale="92500" lnSpcReduction="10000"/>
+          </a:bodyPr>
+          <a:lstStyle/>
+          <a:p>
+            <a:pPr marL="0" indent="0">
+              <a:buNone/>
+            </a:pPr>
             <a:r>
               <a:rPr lang="en-US" dirty="0"/>
-              <a:t>Always Encrypted Limitations</a:t>
+              <a:t>One big limitation (</a:t>
+            </a:r>
+            <a:r>
+              <a:rPr lang="en-US" sz="1900" dirty="0"/>
+              <a:t>from</a:t>
+            </a:r>
+            <a:r>
+              <a:rPr lang="en-US" dirty="0"/>
+              <a:t> </a:t>
+            </a:r>
+            <a:r>
+              <a:rPr lang="en-US" sz="1900" dirty="0">
+                <a:hlinkClick r:id="rId2"/>
+              </a:rPr>
+              <a:t>https://blogs.msdn.microsoft.com/sqlsecurity/2015/10/31/ssms-encryption-wizard-enabling-always-encrypted-in-a-few-easy-steps/</a:t>
+            </a:r>
+            <a:r>
+              <a:rPr lang="en-US" dirty="0"/>
+              <a:t>)</a:t>
+            </a:r>
+          </a:p>
+          <a:p>
+            <a:r>
+              <a:rPr lang="en-US" b="1" i="1" dirty="0"/>
+              <a:t>Note:</a:t>
+            </a:r>
+            <a:r>
+              <a:rPr lang="en-US" i="1" dirty="0"/>
+              <a:t> When using the current version of the wizard, you need to make sure no other application inserts or updates rows in the tables, containing encrypted columns, while the encryption workflow is running. During the encryption workflow, the wizard creates a temporary table, downloads the data from your original table, encrypts the data and uploads it to the temporary table. Finally, the wizard deletes the original table and renames the temporary table to the original table. If another app is inserting or modifying data in the original table, the new or updated data may be lost. Make sure, you only run the encryption workflow in a planned maintenance window. This issue will be addressed in a later version of SSMS.</a:t>
             </a:r>
           </a:p>
         </p:txBody>
@@ -5378,7 +5560,7 @@
     </p:spTree>
     <p:extLst>
       <p:ext uri="{BB962C8B-B14F-4D97-AF65-F5344CB8AC3E}">
-        <p14:creationId xmlns:p14="http://schemas.microsoft.com/office/powerpoint/2010/main" val="3449462831"/>
+        <p14:creationId xmlns:p14="http://schemas.microsoft.com/office/powerpoint/2010/main" val="2611242635"/>
       </p:ext>
     </p:extLst>
   </p:cSld>
@@ -5422,6 +5604,161 @@
           <a:p>
             <a:r>
               <a:rPr lang="en-US" dirty="0"/>
+              <a:t>Demo</a:t>
+            </a:r>
+          </a:p>
+        </p:txBody>
+      </p:sp>
+      <p:sp>
+        <p:nvSpPr>
+          <p:cNvPr id="5" name="Text Placeholder 4"/>
+          <p:cNvSpPr>
+            <a:spLocks noGrp="1"/>
+          </p:cNvSpPr>
+          <p:nvPr>
+            <p:ph type="body" idx="1"/>
+          </p:nvPr>
+        </p:nvSpPr>
+        <p:spPr/>
+        <p:txBody>
+          <a:bodyPr/>
+          <a:lstStyle/>
+          <a:p>
+            <a:r>
+              <a:rPr lang="en-US" dirty="0"/>
+              <a:t>Always Encrypted Limitations</a:t>
+            </a:r>
+          </a:p>
+        </p:txBody>
+      </p:sp>
+    </p:spTree>
+    <p:extLst>
+      <p:ext uri="{BB962C8B-B14F-4D97-AF65-F5344CB8AC3E}">
+        <p14:creationId xmlns:p14="http://schemas.microsoft.com/office/powerpoint/2010/main" val="3449462831"/>
+      </p:ext>
+    </p:extLst>
+  </p:cSld>
+  <p:clrMapOvr>
+    <a:masterClrMapping/>
+  </p:clrMapOvr>
+</p:sld>
+</file>
+
+<file path=ppt/slides/slide22.xml><?xml version="1.0" encoding="utf-8"?>
+<p:sld xmlns:a="http://schemas.openxmlformats.org/drawingml/2006/main" xmlns:r="http://schemas.openxmlformats.org/officeDocument/2006/relationships" xmlns:p="http://schemas.openxmlformats.org/presentationml/2006/main">
+  <p:cSld>
+    <p:spTree>
+      <p:nvGrpSpPr>
+        <p:cNvPr id="1" name=""/>
+        <p:cNvGrpSpPr/>
+        <p:nvPr/>
+      </p:nvGrpSpPr>
+      <p:grpSpPr>
+        <a:xfrm>
+          <a:off x="0" y="0"/>
+          <a:ext cx="0" cy="0"/>
+          <a:chOff x="0" y="0"/>
+          <a:chExt cx="0" cy="0"/>
+        </a:xfrm>
+      </p:grpSpPr>
+      <p:sp>
+        <p:nvSpPr>
+          <p:cNvPr id="4" name="Title 3"/>
+          <p:cNvSpPr>
+            <a:spLocks noGrp="1"/>
+          </p:cNvSpPr>
+          <p:nvPr>
+            <p:ph type="title"/>
+          </p:nvPr>
+        </p:nvSpPr>
+        <p:spPr/>
+        <p:txBody>
+          <a:bodyPr/>
+          <a:lstStyle/>
+          <a:p>
+            <a:r>
+              <a:rPr lang="en-US" dirty="0"/>
+              <a:t>Bonus Demo</a:t>
+            </a:r>
+          </a:p>
+        </p:txBody>
+      </p:sp>
+      <p:sp>
+        <p:nvSpPr>
+          <p:cNvPr id="5" name="Text Placeholder 4"/>
+          <p:cNvSpPr>
+            <a:spLocks noGrp="1"/>
+          </p:cNvSpPr>
+          <p:nvPr>
+            <p:ph type="body" idx="1"/>
+          </p:nvPr>
+        </p:nvSpPr>
+        <p:spPr/>
+        <p:txBody>
+          <a:bodyPr/>
+          <a:lstStyle/>
+          <a:p>
+            <a:r>
+              <a:rPr lang="en-US" dirty="0"/>
+              <a:t>Always Encrypted Key Rotation</a:t>
+            </a:r>
+          </a:p>
+          <a:p>
+            <a:r>
+              <a:rPr lang="en-US"/>
+              <a:t>50_KeyRotation.sql</a:t>
+            </a:r>
+            <a:endParaRPr lang="en-US" dirty="0"/>
+          </a:p>
+        </p:txBody>
+      </p:sp>
+    </p:spTree>
+    <p:extLst>
+      <p:ext uri="{BB962C8B-B14F-4D97-AF65-F5344CB8AC3E}">
+        <p14:creationId xmlns:p14="http://schemas.microsoft.com/office/powerpoint/2010/main" val="4067089543"/>
+      </p:ext>
+    </p:extLst>
+  </p:cSld>
+  <p:clrMapOvr>
+    <a:masterClrMapping/>
+  </p:clrMapOvr>
+</p:sld>
+</file>
+
+<file path=ppt/slides/slide23.xml><?xml version="1.0" encoding="utf-8"?>
+<p:sld xmlns:a="http://schemas.openxmlformats.org/drawingml/2006/main" xmlns:r="http://schemas.openxmlformats.org/officeDocument/2006/relationships" xmlns:p="http://schemas.openxmlformats.org/presentationml/2006/main">
+  <p:cSld>
+    <p:spTree>
+      <p:nvGrpSpPr>
+        <p:cNvPr id="1" name=""/>
+        <p:cNvGrpSpPr/>
+        <p:nvPr/>
+      </p:nvGrpSpPr>
+      <p:grpSpPr>
+        <a:xfrm>
+          <a:off x="0" y="0"/>
+          <a:ext cx="0" cy="0"/>
+          <a:chOff x="0" y="0"/>
+          <a:chExt cx="0" cy="0"/>
+        </a:xfrm>
+      </p:grpSpPr>
+      <p:sp>
+        <p:nvSpPr>
+          <p:cNvPr id="4" name="Title 3"/>
+          <p:cNvSpPr>
+            <a:spLocks noGrp="1"/>
+          </p:cNvSpPr>
+          <p:nvPr>
+            <p:ph type="title"/>
+          </p:nvPr>
+        </p:nvSpPr>
+        <p:spPr/>
+        <p:txBody>
+          <a:bodyPr/>
+          <a:lstStyle/>
+          <a:p>
+            <a:r>
+              <a:rPr lang="en-US" dirty="0"/>
               <a:t>Summary</a:t>
             </a:r>
           </a:p>
@@ -5444,7 +5781,19 @@
           <a:p>
             <a:r>
               <a:rPr lang="en-US" dirty="0"/>
-              <a:t>Encryption is protected from system administrators on the server</a:t>
+              <a:t>Always Encrypted only requires a change to the connection string</a:t>
+            </a:r>
+          </a:p>
+          <a:p>
+            <a:r>
+              <a:rPr lang="en-US" dirty="0"/>
+              <a:t>Data is protected once it leave the client</a:t>
+            </a:r>
+          </a:p>
+          <a:p>
+            <a:r>
+              <a:rPr lang="en-US" dirty="0"/>
+              <a:t>Encrypted data is protected from system administrators on the server</a:t>
             </a:r>
           </a:p>
           <a:p>
@@ -5468,7 +5817,7 @@
 </p:sld>
 </file>
 
-<file path=ppt/slides/slide22.xml><?xml version="1.0" encoding="utf-8"?>
+<file path=ppt/slides/slide24.xml><?xml version="1.0" encoding="utf-8"?>
 <p:sld xmlns:a="http://schemas.openxmlformats.org/drawingml/2006/main" xmlns:r="http://schemas.openxmlformats.org/officeDocument/2006/relationships" xmlns:p="http://schemas.openxmlformats.org/presentationml/2006/main">
   <p:cSld>
     <p:spTree>
@@ -6032,7 +6381,7 @@
 </p:sld>
 </file>
 
-<file path=ppt/slides/slide23.xml><?xml version="1.0" encoding="utf-8"?>
+<file path=ppt/slides/slide25.xml><?xml version="1.0" encoding="utf-8"?>
 <p:sld xmlns:a="http://schemas.openxmlformats.org/drawingml/2006/main" xmlns:r="http://schemas.openxmlformats.org/officeDocument/2006/relationships" xmlns:p="http://schemas.openxmlformats.org/presentationml/2006/main">
   <p:cSld>
     <p:spTree>
@@ -6132,7 +6481,7 @@
 </p:sld>
 </file>
 
-<file path=ppt/slides/slide24.xml><?xml version="1.0" encoding="utf-8"?>
+<file path=ppt/slides/slide26.xml><?xml version="1.0" encoding="utf-8"?>
 <p:sld xmlns:a="http://schemas.openxmlformats.org/drawingml/2006/main" xmlns:r="http://schemas.openxmlformats.org/officeDocument/2006/relationships" xmlns:p="http://schemas.openxmlformats.org/presentationml/2006/main">
   <p:cSld>
     <p:spTree>
@@ -7805,7 +8154,7 @@
         </p:blipFill>
         <p:spPr>
           <a:xfrm>
-            <a:off x="8020050" y="490818"/>
+            <a:off x="8020050" y="694018"/>
             <a:ext cx="1073150" cy="1073150"/>
           </a:xfrm>
           <a:prstGeom prst="rect">
@@ -7821,7 +8170,7 @@
         </p:nvSpPr>
         <p:spPr>
           <a:xfrm>
-            <a:off x="7327900" y="1576016"/>
+            <a:off x="7327900" y="1779216"/>
             <a:ext cx="2705100" cy="523220"/>
           </a:xfrm>
           <a:prstGeom prst="rect">
@@ -7864,7 +8213,7 @@
         </p:blipFill>
         <p:spPr>
           <a:xfrm>
-            <a:off x="7437437" y="2744525"/>
+            <a:off x="7437437" y="2947725"/>
             <a:ext cx="2238375" cy="657225"/>
           </a:xfrm>
           <a:prstGeom prst="rect">
@@ -7880,7 +8229,7 @@
         </p:nvSpPr>
         <p:spPr>
           <a:xfrm>
-            <a:off x="8381999" y="2099236"/>
+            <a:off x="8381999" y="2302436"/>
             <a:ext cx="419100" cy="667404"/>
           </a:xfrm>
           <a:prstGeom prst="downArrow">
@@ -7966,7 +8315,7 @@
         </p:nvSpPr>
         <p:spPr>
           <a:xfrm>
-            <a:off x="7437437" y="3523819"/>
+            <a:off x="7437437" y="3727019"/>
             <a:ext cx="3435351" cy="523220"/>
           </a:xfrm>
           <a:prstGeom prst="rect">
@@ -8068,7 +8417,7 @@
         </p:nvSpPr>
         <p:spPr>
           <a:xfrm>
-            <a:off x="8381999" y="4071191"/>
+            <a:off x="8381999" y="4274391"/>
             <a:ext cx="419100" cy="667404"/>
           </a:xfrm>
           <a:prstGeom prst="downArrow">
@@ -8111,7 +8460,7 @@
         </p:nvSpPr>
         <p:spPr>
           <a:xfrm>
-            <a:off x="7283572" y="5148456"/>
+            <a:off x="7283572" y="5351656"/>
             <a:ext cx="2749428" cy="646331"/>
           </a:xfrm>
           <a:prstGeom prst="rect">

</xml_diff>

<commit_message>
create key script updated
Powershell edited, create script updated
</commit_message>
<xml_diff>
--- a/EndtoEndAlwaysEncrypted.pptx
+++ b/EndtoEndAlwaysEncrypted.pptx
@@ -6045,6 +6045,13 @@
   <p:clrMapOvr>
     <a:masterClrMapping/>
   </p:clrMapOvr>
+  <p:timing>
+    <p:tnLst>
+      <p:par>
+        <p:cTn id="1" dur="indefinite" restart="never" nodeType="tmRoot"/>
+      </p:par>
+    </p:tnLst>
+  </p:timing>
 </p:sld>
 </file>
 
@@ -6104,8 +6111,20 @@
           <a:p>
             <a:r>
               <a:rPr lang="en-US" dirty="0"/>
-              <a:t>Always Encrypted only requires a change to the connection string</a:t>
-            </a:r>
+              <a:t>Always Encrypted only requires a change to the connection </a:t>
+            </a:r>
+            <a:r>
+              <a:rPr lang="en-US" dirty="0" smtClean="0"/>
+              <a:t>string</a:t>
+            </a:r>
+          </a:p>
+          <a:p>
+            <a:pPr lvl="1"/>
+            <a:r>
+              <a:rPr lang="en-US" dirty="0" smtClean="0"/>
+              <a:t>Caveat - collation</a:t>
+            </a:r>
+            <a:endParaRPr lang="en-US" dirty="0"/>
           </a:p>
           <a:p>
             <a:r>
@@ -6137,6 +6156,13 @@
   <p:clrMapOvr>
     <a:masterClrMapping/>
   </p:clrMapOvr>
+  <p:timing>
+    <p:tnLst>
+      <p:par>
+        <p:cTn id="1" dur="indefinite" restart="never" nodeType="tmRoot"/>
+      </p:par>
+    </p:tnLst>
+  </p:timing>
 </p:sld>
 </file>
 
@@ -6189,7 +6215,12 @@
             <p:ph idx="1"/>
           </p:nvPr>
         </p:nvSpPr>
-        <p:spPr/>
+        <p:spPr>
+          <a:xfrm>
+            <a:off x="838200" y="1656947"/>
+            <a:ext cx="10515600" cy="4351338"/>
+          </a:xfrm>
+        </p:spPr>
         <p:txBody>
           <a:bodyPr/>
           <a:lstStyle/>
@@ -6211,11 +6242,27 @@
               <a:t>Ask at </a:t>
             </a:r>
             <a:r>
-              <a:rPr lang="en-US" dirty="0">
+              <a:rPr lang="en-US" dirty="0" smtClean="0">
                 <a:hlinkClick r:id="rId2"/>
               </a:rPr>
               <a:t>www.sqlservercentral.com/forums</a:t>
             </a:r>
+            <a:endParaRPr lang="en-US" dirty="0" smtClean="0"/>
+          </a:p>
+          <a:p>
+            <a:r>
+              <a:rPr lang="en-US" dirty="0" smtClean="0"/>
+              <a:t>Slides/Code at </a:t>
+            </a:r>
+            <a:r>
+              <a:rPr lang="en-US" dirty="0" smtClean="0">
+                <a:hlinkClick r:id="rId3"/>
+              </a:rPr>
+              <a:t>www.voiceofthedba.com/talks</a:t>
+            </a:r>
+            <a:endParaRPr lang="en-US" dirty="0" smtClean="0"/>
+          </a:p>
+          <a:p>
             <a:endParaRPr lang="en-US" dirty="0"/>
           </a:p>
           <a:p>
@@ -6231,7 +6278,7 @@
         </p:nvGrpSpPr>
         <p:grpSpPr>
           <a:xfrm>
-            <a:off x="2779712" y="3716338"/>
+            <a:off x="2779712" y="3831752"/>
             <a:ext cx="6632576" cy="2562226"/>
             <a:chOff x="2689225" y="3398838"/>
             <a:chExt cx="6632576" cy="2562226"/>
@@ -6385,7 +6432,7 @@
             <p:nvPr/>
           </p:nvPicPr>
           <p:blipFill>
-            <a:blip r:embed="rId3">
+            <a:blip r:embed="rId4">
               <a:extLst>
                 <a:ext uri="{28A0092B-C50C-407E-A947-70E740481C1C}">
                   <a14:useLocalDpi xmlns:a14="http://schemas.microsoft.com/office/drawing/2010/main" val="0"/>
@@ -6439,7 +6486,7 @@
             <p:nvPr/>
           </p:nvPicPr>
           <p:blipFill>
-            <a:blip r:embed="rId4">
+            <a:blip r:embed="rId5">
               <a:extLst>
                 <a:ext uri="{28A0092B-C50C-407E-A947-70E740481C1C}">
                   <a14:useLocalDpi xmlns:a14="http://schemas.microsoft.com/office/drawing/2010/main" val="0"/>
@@ -6493,7 +6540,7 @@
             <p:nvPr/>
           </p:nvPicPr>
           <p:blipFill>
-            <a:blip r:embed="rId5">
+            <a:blip r:embed="rId6">
               <a:extLst>
                 <a:ext uri="{28A0092B-C50C-407E-A947-70E740481C1C}">
                   <a14:useLocalDpi xmlns:a14="http://schemas.microsoft.com/office/drawing/2010/main" val="0"/>
@@ -6547,7 +6594,7 @@
             <p:nvPr/>
           </p:nvPicPr>
           <p:blipFill>
-            <a:blip r:embed="rId6">
+            <a:blip r:embed="rId7">
               <a:extLst>
                 <a:ext uri="{28A0092B-C50C-407E-A947-70E740481C1C}">
                   <a14:useLocalDpi xmlns:a14="http://schemas.microsoft.com/office/drawing/2010/main" val="0"/>
@@ -6645,7 +6692,7 @@
             <p:nvPr/>
           </p:nvPicPr>
           <p:blipFill>
-            <a:blip r:embed="rId7">
+            <a:blip r:embed="rId8">
               <a:extLst>
                 <a:ext uri="{28A0092B-C50C-407E-A947-70E740481C1C}">
                   <a14:useLocalDpi xmlns:a14="http://schemas.microsoft.com/office/drawing/2010/main" val="0"/>
@@ -6701,6 +6748,13 @@
   <p:clrMapOvr>
     <a:masterClrMapping/>
   </p:clrMapOvr>
+  <p:timing>
+    <p:tnLst>
+      <p:par>
+        <p:cTn id="1" dur="indefinite" restart="never" nodeType="tmRoot"/>
+      </p:par>
+    </p:tnLst>
+  </p:timing>
 </p:sld>
 </file>
 
@@ -6801,6 +6855,13 @@
   <p:clrMapOvr>
     <a:masterClrMapping/>
   </p:clrMapOvr>
+  <p:timing>
+    <p:tnLst>
+      <p:par>
+        <p:cTn id="1" dur="indefinite" restart="never" nodeType="tmRoot"/>
+      </p:par>
+    </p:tnLst>
+  </p:timing>
 </p:sld>
 </file>
 

</xml_diff>